<commit_message>
change qoo to wglc from adoption
</commit_message>
<xml_diff>
--- a/ietf123-Madrid/Slides/OPS-WG-Updates-IPPM-PERFMETR.pptx
+++ b/ietf123-Madrid/Slides/OPS-WG-Updates-IPPM-PERFMETR.pptx
@@ -4068,14 +4068,10 @@
             <a:pPr lvl="1"/>
             <a:r>
               <a:rPr lang="en-US" dirty="0"/>
-              <a:t>RFC 7799 related OAM terminology discussions </a:t>
-            </a:r>
-            <a:r>
-              <a:rPr lang="en-US"/>
-              <a:t>with </a:t>
-            </a:r>
-            <a:r>
-              <a:rPr lang="en-US" b="1"/>
+              <a:t>RFC 7799 related OAM terminology discussions with </a:t>
+            </a:r>
+            <a:r>
+              <a:rPr lang="en-US" b="1" dirty="0"/>
               <a:t>draft-</a:t>
             </a:r>
             <a:r>
@@ -4178,11 +4174,11 @@
             </a:r>
             <a:r>
               <a:rPr lang="en-US" b="1" dirty="0"/>
-              <a:t>-ippm-</a:t>
+              <a:t>-</a:t>
             </a:r>
             <a:r>
               <a:rPr lang="en-US" b="1" dirty="0" err="1"/>
-              <a:t>qoo</a:t>
+              <a:t>ippm-qoo</a:t>
             </a:r>
             <a:r>
               <a:rPr lang="en-US" b="1" dirty="0"/>
@@ -4190,7 +4186,15 @@
             </a:r>
             <a:r>
               <a:rPr lang="en-US" dirty="0"/>
-              <a:t>has working group adoption in progress. Received good feedback.</a:t>
+              <a:t>has working group </a:t>
+            </a:r>
+            <a:r>
+              <a:rPr lang="en-001" dirty="0"/>
+              <a:t>last call</a:t>
+            </a:r>
+            <a:r>
+              <a:rPr lang="en-US" dirty="0"/>
+              <a:t> in progress. Received good feedback.</a:t>
             </a:r>
           </a:p>
           <a:p>

</xml_diff>